<commit_message>
commiting modified team report for July 18, 2016
</commit_message>
<xml_diff>
--- a/submissions/week_ending_07-18-16/Quad Report Template - 2016-07-18.pptx
+++ b/submissions/week_ending_07-18-16/Quad Report Template - 2016-07-18.pptx
@@ -4281,12 +4281,12 @@
           <a:graphicData uri="http://schemas.openxmlformats.org/presentationml/2006/ole">
             <mc:AlternateContent xmlns:mc="http://schemas.openxmlformats.org/markup-compatibility/2006">
               <mc:Choice xmlns:v="urn:schemas-microsoft-com:vml" Requires="v">
-                <p:oleObj spid="_x0000_s1418" name="Document" r:id="rId4" imgW="2585160" imgH="5576828" progId="Word.Document.8">
+                <p:oleObj spid="_x0000_s1423" name="Document" r:id="rId5" imgW="2585160" imgH="5576828" progId="Word.Document.8">
                   <p:embed/>
                 </p:oleObj>
               </mc:Choice>
               <mc:Fallback>
-                <p:oleObj name="Document" r:id="rId4" imgW="2585160" imgH="5576828" progId="Word.Document.8">
+                <p:oleObj name="Document" r:id="rId5" imgW="2585160" imgH="5576828" progId="Word.Document.8">
                   <p:embed/>
                   <p:pic>
                     <p:nvPicPr>
@@ -4297,7 +4297,7 @@
                       <p:nvPr/>
                     </p:nvPicPr>
                     <p:blipFill>
-                      <a:blip r:embed="rId5">
+                      <a:blip r:embed="rId6">
                         <a:extLst>
                           <a:ext uri="{28A0092B-C50C-407E-A947-70E740481C1C}">
                             <a14:useLocalDpi xmlns:a14="http://schemas.microsoft.com/office/drawing/2010/main" val="0"/>
@@ -4324,14 +4324,14 @@
                       <a:effectLst/>
                       <a:extLst>
                         <a:ext uri="{909E8E84-426E-40dd-AFC4-6F175D3DCCD1}">
-                          <a14:hiddenFill xmlns="" xmlns:a14="http://schemas.microsoft.com/office/drawing/2010/main">
+                          <a14:hiddenFill xmlns:a14="http://schemas.microsoft.com/office/drawing/2010/main" xmlns="">
                             <a:solidFill>
                               <a:schemeClr val="accent1"/>
                             </a:solidFill>
                           </a14:hiddenFill>
                         </a:ext>
                         <a:ext uri="{91240B29-F687-4f45-9708-019B960494DF}">
-                          <a14:hiddenLine xmlns="" xmlns:a14="http://schemas.microsoft.com/office/drawing/2010/main" w="9525">
+                          <a14:hiddenLine xmlns:a14="http://schemas.microsoft.com/office/drawing/2010/main" xmlns="" w="9525">
                             <a:solidFill>
                               <a:schemeClr val="tx1"/>
                             </a:solidFill>
@@ -4341,7 +4341,7 @@
                           </a14:hiddenLine>
                         </a:ext>
                         <a:ext uri="{AF507438-7753-43e0-B8FC-AC1667EBCBE1}">
-                          <a14:hiddenEffects xmlns="" xmlns:a14="http://schemas.microsoft.com/office/drawing/2010/main">
+                          <a14:hiddenEffects xmlns:a14="http://schemas.microsoft.com/office/drawing/2010/main" xmlns="">
                             <a:effectLst>
                               <a:outerShdw blurRad="63500" dist="38099" dir="2700000" algn="ctr" rotWithShape="0">
                                 <a:schemeClr val="bg2">
@@ -4668,12 +4668,12 @@
           <a:graphicData uri="http://schemas.openxmlformats.org/presentationml/2006/ole">
             <mc:AlternateContent xmlns:mc="http://schemas.openxmlformats.org/markup-compatibility/2006">
               <mc:Choice xmlns:v="urn:schemas-microsoft-com:vml" Requires="v">
-                <p:oleObj spid="_x0000_s1419" name="Document" r:id="rId6" imgW="2794000" imgH="1181100" progId="Word.Document.8">
+                <p:oleObj spid="_x0000_s1424" name="Document" r:id="rId8" imgW="2794000" imgH="1181100" progId="Word.Document.8">
                   <p:embed/>
                 </p:oleObj>
               </mc:Choice>
               <mc:Fallback>
-                <p:oleObj name="Document" r:id="rId6" imgW="2794000" imgH="1181100" progId="Word.Document.8">
+                <p:oleObj name="Document" r:id="rId8" imgW="2794000" imgH="1181100" progId="Word.Document.8">
                   <p:embed/>
                   <p:pic>
                     <p:nvPicPr>
@@ -4684,7 +4684,7 @@
                       <p:nvPr/>
                     </p:nvPicPr>
                     <p:blipFill>
-                      <a:blip r:embed="rId7"/>
+                      <a:blip r:embed="rId9"/>
                       <a:srcRect/>
                       <a:stretch>
                         <a:fillRect/>
@@ -4702,14 +4702,14 @@
                       <a:effectLst/>
                       <a:extLst>
                         <a:ext uri="{909E8E84-426E-40dd-AFC4-6F175D3DCCD1}">
-                          <a14:hiddenFill xmlns="" xmlns:a14="http://schemas.microsoft.com/office/drawing/2010/main">
+                          <a14:hiddenFill xmlns:a14="http://schemas.microsoft.com/office/drawing/2010/main" xmlns="">
                             <a:solidFill>
                               <a:srgbClr val="FFFFFF"/>
                             </a:solidFill>
                           </a14:hiddenFill>
                         </a:ext>
                         <a:ext uri="{AF507438-7753-43e0-B8FC-AC1667EBCBE1}">
-                          <a14:hiddenEffects xmlns="" xmlns:a14="http://schemas.microsoft.com/office/drawing/2010/main">
+                          <a14:hiddenEffects xmlns:a14="http://schemas.microsoft.com/office/drawing/2010/main" xmlns="">
                             <a:effectLst>
                               <a:outerShdw blurRad="63500" dist="38099" dir="2700000" algn="ctr" rotWithShape="0">
                                 <a:srgbClr val="000000">
@@ -4959,13 +4959,22 @@
               <a:t>Ending</a:t>
             </a:r>
             <a:r>
-              <a:rPr lang="en-US" sz="1100" b="1" dirty="0" smtClean="0">
+              <a:rPr lang="en-US" sz="1100" b="1" smtClean="0">
                 <a:solidFill>
                   <a:schemeClr val="tx2"/>
                 </a:solidFill>
                 <a:latin typeface="Arial" charset="0"/>
               </a:rPr>
-              <a:t>:  2016-07-08</a:t>
+              <a:t>:  </a:t>
+            </a:r>
+            <a:r>
+              <a:rPr lang="en-US" sz="1100" b="1" smtClean="0">
+                <a:solidFill>
+                  <a:schemeClr val="tx2"/>
+                </a:solidFill>
+                <a:latin typeface="Arial" charset="0"/>
+              </a:rPr>
+              <a:t>2016-07-18</a:t>
             </a:r>
             <a:endParaRPr lang="en-US" sz="1100" dirty="0">
               <a:solidFill>
@@ -5250,12 +5259,12 @@
           <a:graphicData uri="http://schemas.openxmlformats.org/presentationml/2006/ole">
             <mc:AlternateContent xmlns:mc="http://schemas.openxmlformats.org/markup-compatibility/2006">
               <mc:Choice xmlns:v="urn:schemas-microsoft-com:vml" Requires="v">
-                <p:oleObj spid="_x0000_s1420" name="Document" r:id="rId8" imgW="4432300" imgH="2374900" progId="Word.Document.8">
+                <p:oleObj spid="_x0000_s1425" name="Document" r:id="rId11" imgW="4432300" imgH="2374900" progId="Word.Document.8">
                   <p:embed/>
                 </p:oleObj>
               </mc:Choice>
               <mc:Fallback>
-                <p:oleObj name="Document" r:id="rId8" imgW="4432300" imgH="2374900" progId="Word.Document.8">
+                <p:oleObj name="Document" r:id="rId11" imgW="4432300" imgH="2374900" progId="Word.Document.8">
                   <p:embed/>
                   <p:pic>
                     <p:nvPicPr>
@@ -5266,7 +5275,7 @@
                       <p:nvPr/>
                     </p:nvPicPr>
                     <p:blipFill>
-                      <a:blip r:embed="rId9"/>
+                      <a:blip r:embed="rId12"/>
                       <a:srcRect/>
                       <a:stretch>
                         <a:fillRect/>
@@ -5283,7 +5292,7 @@
                       <a:noFill/>
                       <a:extLst>
                         <a:ext uri="{909E8E84-426E-40dd-AFC4-6F175D3DCCD1}">
-                          <a14:hiddenFill xmlns="" xmlns:a14="http://schemas.microsoft.com/office/drawing/2010/main">
+                          <a14:hiddenFill xmlns:a14="http://schemas.microsoft.com/office/drawing/2010/main" xmlns="">
                             <a:solidFill>
                               <a:srgbClr val="FFFFFF"/>
                             </a:solidFill>
@@ -5505,12 +5514,12 @@
           <a:graphicData uri="http://schemas.openxmlformats.org/presentationml/2006/ole">
             <mc:AlternateContent xmlns:mc="http://schemas.openxmlformats.org/markup-compatibility/2006">
               <mc:Choice xmlns:v="urn:schemas-microsoft-com:vml" Requires="v">
-                <p:oleObj spid="_x0000_s1421" name="Document" r:id="rId10" imgW="4406900" imgH="1447800" progId="Word.Document.8">
+                <p:oleObj spid="_x0000_s1426" name="Document" r:id="rId14" imgW="4406900" imgH="1447800" progId="Word.Document.8">
                   <p:embed/>
                 </p:oleObj>
               </mc:Choice>
               <mc:Fallback>
-                <p:oleObj name="Document" r:id="rId10" imgW="4406900" imgH="1447800" progId="Word.Document.8">
+                <p:oleObj name="Document" r:id="rId14" imgW="4406900" imgH="1447800" progId="Word.Document.8">
                   <p:embed/>
                   <p:pic>
                     <p:nvPicPr>
@@ -5521,7 +5530,7 @@
                       <p:nvPr/>
                     </p:nvPicPr>
                     <p:blipFill>
-                      <a:blip r:embed="rId11"/>
+                      <a:blip r:embed="rId15"/>
                       <a:srcRect/>
                       <a:stretch>
                         <a:fillRect/>
@@ -5538,7 +5547,7 @@
                       <a:noFill/>
                       <a:extLst>
                         <a:ext uri="{909E8E84-426E-40dd-AFC4-6F175D3DCCD1}">
-                          <a14:hiddenFill xmlns="" xmlns:a14="http://schemas.microsoft.com/office/drawing/2010/main">
+                          <a14:hiddenFill xmlns:a14="http://schemas.microsoft.com/office/drawing/2010/main" xmlns="">
                             <a:solidFill>
                               <a:srgbClr val="FFFFFF"/>
                             </a:solidFill>
@@ -5600,14 +5609,7 @@
                 <a:latin typeface="Arial" pitchFamily="34" charset="0"/>
                 <a:cs typeface="Arial" pitchFamily="34" charset="0"/>
               </a:rPr>
-              <a:t>Comments</a:t>
-            </a:r>
-            <a:r>
-              <a:rPr lang="en-US" sz="800" b="1" smtClean="0">
-                <a:latin typeface="Arial" pitchFamily="34" charset="0"/>
-                <a:cs typeface="Arial" pitchFamily="34" charset="0"/>
-              </a:rPr>
-              <a:t>:</a:t>
+              <a:t>Comments:</a:t>
             </a:r>
             <a:endParaRPr lang="en-US" sz="800" dirty="0" smtClean="0">
               <a:latin typeface="Arial" pitchFamily="34" charset="0"/>
@@ -5643,14 +5645,7 @@
                 <a:latin typeface="Arial" pitchFamily="34" charset="0"/>
                 <a:cs typeface="Arial" pitchFamily="34" charset="0"/>
               </a:rPr>
-              <a:t>Code </a:t>
-            </a:r>
-            <a:r>
-              <a:rPr lang="en-US" sz="800" dirty="0" smtClean="0">
-                <a:latin typeface="Arial" pitchFamily="34" charset="0"/>
-                <a:cs typeface="Arial" pitchFamily="34" charset="0"/>
-              </a:rPr>
-              <a:t>to be deployed every week to provide product for usability testing</a:t>
+              <a:t>Code to be deployed every week to provide product for usability testing</a:t>
             </a:r>
           </a:p>
           <a:p>
@@ -6166,7 +6161,7 @@
         <a:effectLst/>
         <a:extLst>
           <a:ext uri="{AF507438-7753-43e0-B8FC-AC1667EBCBE1}">
-            <a14:hiddenEffects xmlns="" xmlns:a14="http://schemas.microsoft.com/office/drawing/2010/main">
+            <a14:hiddenEffects xmlns:a14="http://schemas.microsoft.com/office/drawing/2010/main" xmlns="">
               <a:effectLst>
                 <a:outerShdw blurRad="63500" dist="38099" dir="2700000" algn="ctr" rotWithShape="0">
                   <a:schemeClr val="bg2">
@@ -6242,7 +6237,7 @@
         <a:effectLst/>
         <a:extLst>
           <a:ext uri="{AF507438-7753-43e0-B8FC-AC1667EBCBE1}">
-            <a14:hiddenEffects xmlns="" xmlns:a14="http://schemas.microsoft.com/office/drawing/2010/main">
+            <a14:hiddenEffects xmlns:a14="http://schemas.microsoft.com/office/drawing/2010/main" xmlns="">
               <a:effectLst>
                 <a:outerShdw blurRad="63500" dist="38099" dir="2700000" algn="ctr" rotWithShape="0">
                   <a:schemeClr val="bg2">

</xml_diff>